<commit_message>
resolves #16; changed "last slide" to "earlier"
The slides really should eventually be improved as per #5; they
currently include all kinds of per-build sequences where the next slide
just adds one more bullet and so on. Messy.
</commit_message>
<xml_diff>
--- a/11-naive_bayes/slides.pptx
+++ b/11-naive_bayes/slides.pptx
@@ -294,7 +294,7 @@
           <a:p>
             <a:fld id="{DB92F479-4B50-F243-9713-1B12EC2B4BDB}" type="datetimeFigureOut">
               <a:rPr lang="en-US" smtClean="0"/>
-              <a:t>3/22/14</a:t>
+              <a:t>7/5/14</a:t>
             </a:fld>
             <a:endParaRPr lang="en-US"/>
           </a:p>
@@ -14391,11 +14391,7 @@
             </a:r>
             <a:r>
               <a:rPr lang="en-US" sz="5000" dirty="0" smtClean="0"/>
-              <a:t> </a:t>
-            </a:r>
-            <a:r>
-              <a:rPr lang="en-US" sz="5000" dirty="0" smtClean="0"/>
-              <a:t>classification</a:t>
+              <a:t> classification</a:t>
             </a:r>
             <a:endParaRPr lang="en-US" sz="5000" dirty="0"/>
           </a:p>
@@ -15376,15 +15372,6 @@
                 </a:rPr>
                 <a:t>∩ B)”.</a:t>
               </a:r>
-              <a:endParaRPr lang="en-US" sz="900" dirty="0" smtClean="0">
-                <a:solidFill>
-                  <a:schemeClr val="tx1"/>
-                </a:solidFill>
-                <a:latin typeface="PFDinDisplayPro-Italic"/>
-                <a:ea typeface="ＭＳ Ｐゴシック" charset="0"/>
-                <a:cs typeface="PFDinDisplayPro-Italic"/>
-                <a:sym typeface="News706 BT" charset="0"/>
-              </a:endParaRPr>
             </a:p>
           </p:txBody>
         </p:sp>
@@ -15517,28 +15504,14 @@
                 <a:latin typeface="PFDinTextCompPro-Italic"/>
                 <a:cs typeface="PFDinTextCompPro-Italic"/>
               </a:rPr>
-              <a:t>Q: </a:t>
-            </a:r>
-            <a:r>
-              <a:rPr lang="en-US" sz="3000" dirty="0" smtClean="0">
-                <a:latin typeface="PFDinTextCompPro-Italic"/>
-                <a:cs typeface="PFDinTextCompPro-Italic"/>
-              </a:rPr>
-              <a:t>Is </a:t>
+              <a:t>Q: Is </a:t>
             </a:r>
             <a:r>
               <a:rPr lang="en-US" sz="2000" i="1" dirty="0">
                 <a:latin typeface="+mn-lt"/>
                 <a:cs typeface="PFDinTextCompPro-Italic"/>
               </a:rPr>
-              <a:t>P(AB</a:t>
-            </a:r>
-            <a:r>
-              <a:rPr lang="en-US" sz="2000" i="1" dirty="0">
-                <a:latin typeface="+mn-lt"/>
-                <a:cs typeface="PFDinTextCompPro-Italic"/>
-              </a:rPr>
-              <a:t>) </a:t>
+              <a:t>P(AB) </a:t>
             </a:r>
             <a:r>
               <a:rPr lang="en-US" sz="3000" dirty="0">
@@ -15695,28 +15668,14 @@
                 <a:latin typeface="PFDinTextCompPro-Italic"/>
                 <a:cs typeface="PFDinTextCompPro-Italic"/>
               </a:rPr>
-              <a:t>Q: </a:t>
-            </a:r>
-            <a:r>
-              <a:rPr lang="en-US" sz="3000" dirty="0" smtClean="0">
-                <a:latin typeface="PFDinTextCompPro-Italic"/>
-                <a:cs typeface="PFDinTextCompPro-Italic"/>
-              </a:rPr>
-              <a:t>Is </a:t>
+              <a:t>Q: Is </a:t>
             </a:r>
             <a:r>
               <a:rPr lang="en-US" sz="2000" i="1" dirty="0">
                 <a:latin typeface="+mn-lt"/>
                 <a:cs typeface="PFDinTextCompPro-Italic"/>
               </a:rPr>
-              <a:t>P(AB</a:t>
-            </a:r>
-            <a:r>
-              <a:rPr lang="en-US" sz="2000" i="1" dirty="0">
-                <a:latin typeface="+mn-lt"/>
-                <a:cs typeface="PFDinTextCompPro-Italic"/>
-              </a:rPr>
-              <a:t>) </a:t>
+              <a:t>P(AB) </a:t>
             </a:r>
             <a:r>
               <a:rPr lang="en-US" sz="3000" dirty="0">
@@ -18151,23 +18110,7 @@
                 <a:ea typeface="ヒラギノ角ゴ ProN W6" charset="0"/>
                 <a:cs typeface="ヒラギノ角ゴ ProN W6" charset="0"/>
               </a:rPr>
-              <a:t>. Naïve </a:t>
-            </a:r>
-            <a:r>
-              <a:rPr lang="en-US" sz="3000" dirty="0" smtClean="0">
-                <a:latin typeface="PFDinTextCompPro-Bold" charset="0"/>
-                <a:ea typeface="ヒラギノ角ゴ ProN W6" charset="0"/>
-                <a:cs typeface="ヒラギノ角ゴ ProN W6" charset="0"/>
-              </a:rPr>
-              <a:t>Bayes </a:t>
-            </a:r>
-            <a:r>
-              <a:rPr lang="en-US" sz="3000" dirty="0" smtClean="0">
-                <a:latin typeface="PFDinTextCompPro-Bold" charset="0"/>
-                <a:ea typeface="ヒラギノ角ゴ ProN W6" charset="0"/>
-                <a:cs typeface="ヒラギノ角ゴ ProN W6" charset="0"/>
-              </a:rPr>
-              <a:t>classification</a:t>
+              <a:t>. Naïve Bayes classification</a:t>
             </a:r>
             <a:br>
               <a:rPr lang="en-US" sz="3000" dirty="0" smtClean="0">
@@ -18199,14 +18142,6 @@
               </a:rPr>
               <a:t>LAB:</a:t>
             </a:r>
-            <a:r>
-              <a:rPr lang="en-US" sz="3000" dirty="0" smtClean="0">
-                <a:latin typeface="PFDinTextCompPro-Bold" charset="0"/>
-                <a:ea typeface="ヒラギノ角ゴ ProN W6" charset="0"/>
-                <a:cs typeface="ヒラギノ角ゴ ProN W6" charset="0"/>
-              </a:rPr>
-              <a:t/>
-            </a:r>
             <a:br>
               <a:rPr lang="en-US" sz="3000" dirty="0" smtClean="0">
                 <a:latin typeface="PFDinTextCompPro-Bold" charset="0"/>
@@ -18220,23 +18155,7 @@
                 <a:ea typeface="ヒラギノ角ゴ ProN W6" charset="0"/>
                 <a:cs typeface="ヒラギノ角ゴ ProN W6" charset="0"/>
               </a:rPr>
-              <a:t>III. </a:t>
-            </a:r>
-            <a:r>
-              <a:rPr lang="en-US" sz="3000" dirty="0" smtClean="0">
-                <a:latin typeface="PFDinTextCompPro-Bold" charset="0"/>
-                <a:ea typeface="ヒラギノ角ゴ ProN W6" charset="0"/>
-                <a:cs typeface="ヒラギノ角ゴ ProN W6" charset="0"/>
-              </a:rPr>
-              <a:t>a </a:t>
-            </a:r>
-            <a:r>
-              <a:rPr lang="en-US" sz="3000" dirty="0" smtClean="0">
-                <a:latin typeface="PFDinTextCompPro-Bold" charset="0"/>
-                <a:ea typeface="ヒラギノ角ゴ ProN W6" charset="0"/>
-                <a:cs typeface="ヒラギノ角ゴ ProN W6" charset="0"/>
-              </a:rPr>
-              <a:t>spam filter</a:t>
+              <a:t>III. a spam filter</a:t>
             </a:r>
             <a:endParaRPr lang="en-US" sz="3000" cap="none" dirty="0">
               <a:latin typeface="PFDinTextCompPro-Bold" charset="0"/>
@@ -19203,35 +19122,7 @@
                 <a:latin typeface="PFDinTextCompPro-Italic"/>
                 <a:cs typeface="PFDinTextCompPro-Italic"/>
               </a:rPr>
-              <a:t>Probably the only </a:t>
-            </a:r>
-            <a:r>
-              <a:rPr lang="en-US" sz="3000" dirty="0" smtClean="0">
-                <a:latin typeface="PFDinTextCompPro-Italic"/>
-                <a:cs typeface="PFDinTextCompPro-Italic"/>
-              </a:rPr>
-              <a:t>proof in </a:t>
-            </a:r>
-            <a:r>
-              <a:rPr lang="en-US" sz="3000" dirty="0" smtClean="0">
-                <a:latin typeface="PFDinTextCompPro-Italic"/>
-                <a:cs typeface="PFDinTextCompPro-Italic"/>
-              </a:rPr>
-              <a:t>the </a:t>
-            </a:r>
-            <a:r>
-              <a:rPr lang="en-US" sz="3000" dirty="0" smtClean="0">
-                <a:latin typeface="PFDinTextCompPro-Italic"/>
-                <a:cs typeface="PFDinTextCompPro-Italic"/>
-              </a:rPr>
-              <a:t>course</a:t>
-            </a:r>
-            <a:r>
-              <a:rPr lang="en-US" sz="3000" dirty="0" smtClean="0">
-                <a:latin typeface="PFDinTextCompPro-Italic"/>
-                <a:cs typeface="PFDinTextCompPro-Italic"/>
-              </a:rPr>
-              <a:t>:</a:t>
+              <a:t>Probably the only proof in the course:</a:t>
             </a:r>
           </a:p>
           <a:p>
@@ -19378,35 +19269,7 @@
                 <a:latin typeface="PFDinTextCompPro-Italic"/>
                 <a:cs typeface="PFDinTextCompPro-Italic"/>
               </a:rPr>
-              <a:t>Probably the only </a:t>
-            </a:r>
-            <a:r>
-              <a:rPr lang="en-US" sz="3000" dirty="0" smtClean="0">
-                <a:latin typeface="PFDinTextCompPro-Italic"/>
-                <a:cs typeface="PFDinTextCompPro-Italic"/>
-              </a:rPr>
-              <a:t>proof in </a:t>
-            </a:r>
-            <a:r>
-              <a:rPr lang="en-US" sz="3000" dirty="0" smtClean="0">
-                <a:latin typeface="PFDinTextCompPro-Italic"/>
-                <a:cs typeface="PFDinTextCompPro-Italic"/>
-              </a:rPr>
-              <a:t>the </a:t>
-            </a:r>
-            <a:r>
-              <a:rPr lang="en-US" sz="3000" dirty="0" smtClean="0">
-                <a:latin typeface="PFDinTextCompPro-Italic"/>
-                <a:cs typeface="PFDinTextCompPro-Italic"/>
-              </a:rPr>
-              <a:t>course</a:t>
-            </a:r>
-            <a:r>
-              <a:rPr lang="en-US" sz="3000" dirty="0" smtClean="0">
-                <a:latin typeface="PFDinTextCompPro-Italic"/>
-                <a:cs typeface="PFDinTextCompPro-Italic"/>
-              </a:rPr>
-              <a:t>:</a:t>
+              <a:t>Probably the only proof in the course:</a:t>
             </a:r>
           </a:p>
           <a:p>
@@ -19451,7 +19314,14 @@
                 <a:latin typeface="PFDinTextCompPro-Italic"/>
                 <a:cs typeface="PFDinTextCompPro-Italic"/>
               </a:rPr>
-              <a:t>from last slide</a:t>
+              <a:t>from </a:t>
+            </a:r>
+            <a:r>
+              <a:rPr lang="en-US" sz="3000" dirty="0" smtClean="0">
+                <a:latin typeface="PFDinTextCompPro-Italic"/>
+                <a:cs typeface="PFDinTextCompPro-Italic"/>
+              </a:rPr>
+              <a:t>earlier</a:t>
             </a:r>
             <a:endParaRPr lang="en-US" sz="3000" dirty="0">
               <a:latin typeface="PFDinTextCompPro-Italic"/>
@@ -19602,35 +19472,7 @@
                 <a:latin typeface="PFDinTextCompPro-Italic"/>
                 <a:cs typeface="PFDinTextCompPro-Italic"/>
               </a:rPr>
-              <a:t>only </a:t>
-            </a:r>
-            <a:r>
-              <a:rPr lang="en-US" sz="3000" dirty="0" smtClean="0">
-                <a:latin typeface="PFDinTextCompPro-Italic"/>
-                <a:cs typeface="PFDinTextCompPro-Italic"/>
-              </a:rPr>
-              <a:t>proof in </a:t>
-            </a:r>
-            <a:r>
-              <a:rPr lang="en-US" sz="3000" dirty="0" smtClean="0">
-                <a:latin typeface="PFDinTextCompPro-Italic"/>
-                <a:cs typeface="PFDinTextCompPro-Italic"/>
-              </a:rPr>
-              <a:t>the </a:t>
-            </a:r>
-            <a:r>
-              <a:rPr lang="en-US" sz="3000" dirty="0" smtClean="0">
-                <a:latin typeface="PFDinTextCompPro-Italic"/>
-                <a:cs typeface="PFDinTextCompPro-Italic"/>
-              </a:rPr>
-              <a:t>course</a:t>
-            </a:r>
-            <a:r>
-              <a:rPr lang="en-US" sz="3000" dirty="0" smtClean="0">
-                <a:latin typeface="PFDinTextCompPro-Italic"/>
-                <a:cs typeface="PFDinTextCompPro-Italic"/>
-              </a:rPr>
-              <a:t>:</a:t>
+              <a:t>only proof in the course:</a:t>
             </a:r>
           </a:p>
           <a:p>
@@ -19675,8 +19517,19 @@
                 <a:latin typeface="PFDinTextCompPro-Italic"/>
                 <a:cs typeface="PFDinTextCompPro-Italic"/>
               </a:rPr>
-              <a:t>from last slide</a:t>
-            </a:r>
+              <a:t>from </a:t>
+            </a:r>
+            <a:r>
+              <a:rPr lang="en-US" sz="3000" dirty="0" smtClean="0">
+                <a:latin typeface="PFDinTextCompPro-Italic"/>
+                <a:cs typeface="PFDinTextCompPro-Italic"/>
+              </a:rPr>
+              <a:t>earlier</a:t>
+            </a:r>
+            <a:endParaRPr lang="en-US" sz="3000" dirty="0" smtClean="0">
+              <a:latin typeface="PFDinTextCompPro-Italic"/>
+              <a:cs typeface="PFDinTextCompPro-Italic"/>
+            </a:endParaRPr>
           </a:p>
           <a:p>
             <a:pPr algn="l"/>
@@ -19857,35 +19710,7 @@
                 <a:latin typeface="PFDinTextCompPro-Italic"/>
                 <a:cs typeface="PFDinTextCompPro-Italic"/>
               </a:rPr>
-              <a:t>only </a:t>
-            </a:r>
-            <a:r>
-              <a:rPr lang="en-US" sz="3000" dirty="0" smtClean="0">
-                <a:latin typeface="PFDinTextCompPro-Italic"/>
-                <a:cs typeface="PFDinTextCompPro-Italic"/>
-              </a:rPr>
-              <a:t>proof in </a:t>
-            </a:r>
-            <a:r>
-              <a:rPr lang="en-US" sz="3000" dirty="0" smtClean="0">
-                <a:latin typeface="PFDinTextCompPro-Italic"/>
-                <a:cs typeface="PFDinTextCompPro-Italic"/>
-              </a:rPr>
-              <a:t>the </a:t>
-            </a:r>
-            <a:r>
-              <a:rPr lang="en-US" sz="3000" dirty="0" smtClean="0">
-                <a:latin typeface="PFDinTextCompPro-Italic"/>
-                <a:cs typeface="PFDinTextCompPro-Italic"/>
-              </a:rPr>
-              <a:t>course</a:t>
-            </a:r>
-            <a:r>
-              <a:rPr lang="en-US" sz="3000" dirty="0" smtClean="0">
-                <a:latin typeface="PFDinTextCompPro-Italic"/>
-                <a:cs typeface="PFDinTextCompPro-Italic"/>
-              </a:rPr>
-              <a:t>:</a:t>
+              <a:t>only proof in the course:</a:t>
             </a:r>
           </a:p>
           <a:p>
@@ -19930,8 +19755,19 @@
                 <a:latin typeface="PFDinTextCompPro-Italic"/>
                 <a:cs typeface="PFDinTextCompPro-Italic"/>
               </a:rPr>
-              <a:t>from last slide</a:t>
-            </a:r>
+              <a:t>from </a:t>
+            </a:r>
+            <a:r>
+              <a:rPr lang="en-US" sz="3000" dirty="0" smtClean="0">
+                <a:latin typeface="PFDinTextCompPro-Italic"/>
+                <a:cs typeface="PFDinTextCompPro-Italic"/>
+              </a:rPr>
+              <a:t>earlier</a:t>
+            </a:r>
+            <a:endParaRPr lang="en-US" sz="3000" dirty="0" smtClean="0">
+              <a:latin typeface="PFDinTextCompPro-Italic"/>
+              <a:cs typeface="PFDinTextCompPro-Italic"/>
+            </a:endParaRPr>
           </a:p>
           <a:p>
             <a:pPr algn="l"/>
@@ -20172,35 +20008,7 @@
                 <a:latin typeface="PFDinTextCompPro-Italic"/>
                 <a:cs typeface="PFDinTextCompPro-Italic"/>
               </a:rPr>
-              <a:t>only </a:t>
-            </a:r>
-            <a:r>
-              <a:rPr lang="en-US" sz="3000" dirty="0" smtClean="0">
-                <a:latin typeface="PFDinTextCompPro-Italic"/>
-                <a:cs typeface="PFDinTextCompPro-Italic"/>
-              </a:rPr>
-              <a:t>proof in </a:t>
-            </a:r>
-            <a:r>
-              <a:rPr lang="en-US" sz="3000" dirty="0" smtClean="0">
-                <a:latin typeface="PFDinTextCompPro-Italic"/>
-                <a:cs typeface="PFDinTextCompPro-Italic"/>
-              </a:rPr>
-              <a:t>the </a:t>
-            </a:r>
-            <a:r>
-              <a:rPr lang="en-US" sz="3000" dirty="0" smtClean="0">
-                <a:latin typeface="PFDinTextCompPro-Italic"/>
-                <a:cs typeface="PFDinTextCompPro-Italic"/>
-              </a:rPr>
-              <a:t>course</a:t>
-            </a:r>
-            <a:r>
-              <a:rPr lang="en-US" sz="3000" dirty="0" smtClean="0">
-                <a:latin typeface="PFDinTextCompPro-Italic"/>
-                <a:cs typeface="PFDinTextCompPro-Italic"/>
-              </a:rPr>
-              <a:t>:</a:t>
+              <a:t>only proof in the course:</a:t>
             </a:r>
           </a:p>
           <a:p>
@@ -20245,8 +20053,19 @@
                 <a:latin typeface="PFDinTextCompPro-Italic"/>
                 <a:cs typeface="PFDinTextCompPro-Italic"/>
               </a:rPr>
-              <a:t>from last slide</a:t>
-            </a:r>
+              <a:t>from </a:t>
+            </a:r>
+            <a:r>
+              <a:rPr lang="en-US" sz="3000" dirty="0" smtClean="0">
+                <a:latin typeface="PFDinTextCompPro-Italic"/>
+                <a:cs typeface="PFDinTextCompPro-Italic"/>
+              </a:rPr>
+              <a:t>earlier</a:t>
+            </a:r>
+            <a:endParaRPr lang="en-US" sz="3000" dirty="0" smtClean="0">
+              <a:latin typeface="PFDinTextCompPro-Italic"/>
+              <a:cs typeface="PFDinTextCompPro-Italic"/>
+            </a:endParaRPr>
           </a:p>
           <a:p>
             <a:pPr algn="l"/>
@@ -20539,35 +20358,7 @@
                 <a:latin typeface="PFDinTextCompPro-Italic"/>
                 <a:cs typeface="PFDinTextCompPro-Italic"/>
               </a:rPr>
-              <a:t>only </a:t>
-            </a:r>
-            <a:r>
-              <a:rPr lang="en-US" sz="3000" dirty="0" smtClean="0">
-                <a:latin typeface="PFDinTextCompPro-Italic"/>
-                <a:cs typeface="PFDinTextCompPro-Italic"/>
-              </a:rPr>
-              <a:t>proof in </a:t>
-            </a:r>
-            <a:r>
-              <a:rPr lang="en-US" sz="3000" dirty="0" smtClean="0">
-                <a:latin typeface="PFDinTextCompPro-Italic"/>
-                <a:cs typeface="PFDinTextCompPro-Italic"/>
-              </a:rPr>
-              <a:t>the </a:t>
-            </a:r>
-            <a:r>
-              <a:rPr lang="en-US" sz="3000" dirty="0" smtClean="0">
-                <a:latin typeface="PFDinTextCompPro-Italic"/>
-                <a:cs typeface="PFDinTextCompPro-Italic"/>
-              </a:rPr>
-              <a:t>course</a:t>
-            </a:r>
-            <a:r>
-              <a:rPr lang="en-US" sz="3000" dirty="0" smtClean="0">
-                <a:latin typeface="PFDinTextCompPro-Italic"/>
-                <a:cs typeface="PFDinTextCompPro-Italic"/>
-              </a:rPr>
-              <a:t>:</a:t>
+              <a:t>only proof in the course:</a:t>
             </a:r>
           </a:p>
           <a:p>
@@ -20612,8 +20403,19 @@
                 <a:latin typeface="PFDinTextCompPro-Italic"/>
                 <a:cs typeface="PFDinTextCompPro-Italic"/>
               </a:rPr>
-              <a:t>from last slide</a:t>
-            </a:r>
+              <a:t>from </a:t>
+            </a:r>
+            <a:r>
+              <a:rPr lang="en-US" sz="3000" dirty="0" smtClean="0">
+                <a:latin typeface="PFDinTextCompPro-Italic"/>
+                <a:cs typeface="PFDinTextCompPro-Italic"/>
+              </a:rPr>
+              <a:t>earlier</a:t>
+            </a:r>
+            <a:endParaRPr lang="en-US" sz="3000" dirty="0" smtClean="0">
+              <a:latin typeface="PFDinTextCompPro-Italic"/>
+              <a:cs typeface="PFDinTextCompPro-Italic"/>
+            </a:endParaRPr>
           </a:p>
           <a:p>
             <a:pPr algn="l"/>
@@ -23115,11 +22917,7 @@
             </a:r>
             <a:r>
               <a:rPr lang="en-US" sz="7500" dirty="0" smtClean="0"/>
-              <a:t> </a:t>
-            </a:r>
-            <a:r>
-              <a:rPr lang="en-US" sz="7500" dirty="0" smtClean="0"/>
-              <a:t>classification</a:t>
+              <a:t> classification</a:t>
             </a:r>
             <a:endParaRPr lang="en-US" sz="7500" dirty="0"/>
           </a:p>
@@ -24277,21 +24075,7 @@
                 <a:latin typeface="PFDinTextCompPro-Italic"/>
                 <a:cs typeface="PFDinTextCompPro-Italic"/>
               </a:rPr>
-              <a:t>We can </a:t>
-            </a:r>
-            <a:r>
-              <a:rPr lang="en-US" sz="3000" dirty="0" smtClean="0">
-                <a:latin typeface="PFDinTextCompPro-Italic"/>
-                <a:cs typeface="PFDinTextCompPro-Italic"/>
-              </a:rPr>
-              <a:t>approximate the </a:t>
-            </a:r>
-            <a:r>
-              <a:rPr lang="en-US" sz="3000" dirty="0" smtClean="0">
-                <a:latin typeface="PFDinTextCompPro-Italic"/>
-                <a:cs typeface="PFDinTextCompPro-Italic"/>
-              </a:rPr>
-              <a:t>value of the likelihood function from the training data. </a:t>
+              <a:t>We can approximate the value of the likelihood function from the training data. </a:t>
             </a:r>
           </a:p>
         </p:txBody>
@@ -26489,11 +26273,7 @@
             </a:r>
             <a:r>
               <a:rPr lang="en-US" dirty="0" smtClean="0"/>
-              <a:t> </a:t>
-            </a:r>
-            <a:r>
-              <a:rPr lang="en-US" dirty="0" smtClean="0"/>
-              <a:t>classification</a:t>
+              <a:t> classification</a:t>
             </a:r>
           </a:p>
         </p:txBody>
@@ -26634,11 +26414,7 @@
             </a:r>
             <a:r>
               <a:rPr lang="en-US" dirty="0" smtClean="0"/>
-              <a:t> </a:t>
-            </a:r>
-            <a:r>
-              <a:rPr lang="en-US" dirty="0" smtClean="0"/>
-              <a:t>classification</a:t>
+              <a:t> classification</a:t>
             </a:r>
           </a:p>
         </p:txBody>
@@ -26861,11 +26637,7 @@
             </a:r>
             <a:r>
               <a:rPr lang="en-US" dirty="0" smtClean="0"/>
-              <a:t> </a:t>
-            </a:r>
-            <a:r>
-              <a:rPr lang="en-US" dirty="0" smtClean="0"/>
-              <a:t>classification</a:t>
+              <a:t> classification</a:t>
             </a:r>
           </a:p>
         </p:txBody>
@@ -27104,11 +26876,7 @@
             </a:r>
             <a:r>
               <a:rPr lang="en-US" dirty="0" smtClean="0"/>
-              <a:t> </a:t>
-            </a:r>
-            <a:r>
-              <a:rPr lang="en-US" dirty="0" smtClean="0"/>
-              <a:t>classification</a:t>
+              <a:t> classification</a:t>
             </a:r>
           </a:p>
         </p:txBody>
@@ -27266,11 +27034,7 @@
             </a:r>
             <a:r>
               <a:rPr lang="en-US" dirty="0" smtClean="0"/>
-              <a:t> </a:t>
-            </a:r>
-            <a:r>
-              <a:rPr lang="en-US" dirty="0" smtClean="0"/>
-              <a:t>classification</a:t>
+              <a:t> classification</a:t>
             </a:r>
           </a:p>
         </p:txBody>
@@ -27411,11 +27175,7 @@
             </a:r>
             <a:r>
               <a:rPr lang="en-US" dirty="0" smtClean="0"/>
-              <a:t> </a:t>
-            </a:r>
-            <a:r>
-              <a:rPr lang="en-US" dirty="0" smtClean="0"/>
-              <a:t>classification</a:t>
+              <a:t> classification</a:t>
             </a:r>
           </a:p>
         </p:txBody>
@@ -27819,11 +27579,7 @@
             </a:r>
             <a:r>
               <a:rPr lang="en-US" dirty="0" smtClean="0"/>
-              <a:t> </a:t>
-            </a:r>
-            <a:r>
-              <a:rPr lang="en-US" dirty="0" smtClean="0"/>
-              <a:t>classification</a:t>
+              <a:t> classification</a:t>
             </a:r>
           </a:p>
         </p:txBody>
@@ -28169,11 +27925,7 @@
             </a:r>
             <a:r>
               <a:rPr lang="en-US" dirty="0" smtClean="0"/>
-              <a:t> </a:t>
-            </a:r>
-            <a:r>
-              <a:rPr lang="en-US" dirty="0" smtClean="0"/>
-              <a:t>classification</a:t>
+              <a:t> classification</a:t>
             </a:r>
           </a:p>
         </p:txBody>
@@ -29016,21 +28768,8 @@
                 <a:ea typeface="ヒラギノ角ゴ ProN W3" charset="0"/>
                 <a:cs typeface="PFDinTextCompPro-Italic"/>
               </a:rPr>
-              <a:t>	- </a:t>
-            </a:r>
-            <a:r>
-              <a:rPr lang="en-US" sz="2300" dirty="0" smtClean="0">
-                <a:latin typeface="PFDinTextCompPro-Italic"/>
-                <a:ea typeface="ヒラギノ角ゴ ProN W3" charset="0"/>
-                <a:cs typeface="PFDinTextCompPro-Italic"/>
-              </a:rPr>
-              <a:t>tm, R</a:t>
-            </a:r>
-            <a:endParaRPr lang="en-US" sz="2300" dirty="0" smtClean="0">
-              <a:latin typeface="PFDinTextCompPro-Italic"/>
-              <a:ea typeface="ヒラギノ角ゴ ProN W3" charset="0"/>
-              <a:cs typeface="PFDinTextCompPro-Italic"/>
-            </a:endParaRPr>
+              <a:t>	- tm, R</a:t>
+            </a:r>
           </a:p>
           <a:p>
             <a:pPr marL="0" indent="0">
@@ -29879,21 +29618,7 @@
                 <a:latin typeface="PFDinTextCompPro-Italic"/>
                 <a:cs typeface="PFDinTextCompPro-Italic"/>
               </a:rPr>
-              <a:t>The </a:t>
-            </a:r>
-            <a:r>
-              <a:rPr lang="en-US" sz="3000" dirty="0" smtClean="0">
-                <a:latin typeface="PFDinTextCompPro-Italic"/>
-                <a:cs typeface="PFDinTextCompPro-Italic"/>
-              </a:rPr>
-              <a:t>total probability </a:t>
-            </a:r>
-            <a:r>
-              <a:rPr lang="en-US" sz="3000" dirty="0" smtClean="0">
-                <a:latin typeface="PFDinTextCompPro-Italic"/>
-                <a:cs typeface="PFDinTextCompPro-Italic"/>
-              </a:rPr>
-              <a:t>of the sample space </a:t>
+              <a:t>The total probability of the sample space </a:t>
             </a:r>
             <a:r>
               <a:rPr lang="en-US" sz="2000" i="1" dirty="0" smtClean="0">

</xml_diff>

<commit_message>
remove R-specific slide; closes #201
</commit_message>
<xml_diff>
--- a/11-naive_bayes/slides.pptx
+++ b/11-naive_bayes/slides.pptx
@@ -6,7 +6,7 @@
     <p:sldMasterId id="2147483649" r:id="rId2"/>
   </p:sldMasterIdLst>
   <p:notesMasterIdLst>
-    <p:notesMasterId r:id="rId66"/>
+    <p:notesMasterId r:id="rId65"/>
   </p:notesMasterIdLst>
   <p:sldIdLst>
     <p:sldId id="258" r:id="rId3"/>
@@ -71,7 +71,6 @@
     <p:sldId id="543" r:id="rId62"/>
     <p:sldId id="542" r:id="rId63"/>
     <p:sldId id="355" r:id="rId64"/>
-    <p:sldId id="334" r:id="rId65"/>
   </p:sldIdLst>
   <p:sldSz cx="9363075" cy="5257800"/>
   <p:notesSz cx="6858000" cy="9144000"/>
@@ -294,7 +293,7 @@
           <a:p>
             <a:fld id="{DB92F479-4B50-F243-9713-1B12EC2B4BDB}" type="datetimeFigureOut">
               <a:rPr lang="en-US" smtClean="0"/>
-              <a:t>7/5/14</a:t>
+              <a:t>8/30/14</a:t>
             </a:fld>
             <a:endParaRPr lang="en-US"/>
           </a:p>
@@ -7497,112 +7496,6 @@
     <p:extLst>
       <p:ext uri="{BB962C8B-B14F-4D97-AF65-F5344CB8AC3E}">
         <p14:creationId xmlns:p14="http://schemas.microsoft.com/office/powerpoint/2010/main" val="158773868"/>
-      </p:ext>
-    </p:extLst>
-  </p:cSld>
-  <p:clrMapOvr>
-    <a:masterClrMapping/>
-  </p:clrMapOvr>
-</p:notes>
-</file>
-
-<file path=ppt/notesSlides/notesSlide63.xml><?xml version="1.0" encoding="utf-8"?>
-<p:notes xmlns:a="http://schemas.openxmlformats.org/drawingml/2006/main" xmlns:r="http://schemas.openxmlformats.org/officeDocument/2006/relationships" xmlns:p="http://schemas.openxmlformats.org/presentationml/2006/main">
-  <p:cSld>
-    <p:spTree>
-      <p:nvGrpSpPr>
-        <p:cNvPr id="1" name=""/>
-        <p:cNvGrpSpPr/>
-        <p:nvPr/>
-      </p:nvGrpSpPr>
-      <p:grpSpPr>
-        <a:xfrm>
-          <a:off x="0" y="0"/>
-          <a:ext cx="0" cy="0"/>
-          <a:chOff x="0" y="0"/>
-          <a:chExt cx="0" cy="0"/>
-        </a:xfrm>
-      </p:grpSpPr>
-      <p:sp>
-        <p:nvSpPr>
-          <p:cNvPr id="2" name="Slide Image Placeholder 1"/>
-          <p:cNvSpPr>
-            <a:spLocks noGrp="1" noRot="1" noChangeAspect="1"/>
-          </p:cNvSpPr>
-          <p:nvPr>
-            <p:ph type="sldImg"/>
-          </p:nvPr>
-        </p:nvSpPr>
-        <p:spPr/>
-      </p:sp>
-      <p:sp>
-        <p:nvSpPr>
-          <p:cNvPr id="3" name="Notes Placeholder 2"/>
-          <p:cNvSpPr>
-            <a:spLocks noGrp="1"/>
-          </p:cNvSpPr>
-          <p:nvPr>
-            <p:ph type="body" idx="1"/>
-          </p:nvPr>
-        </p:nvSpPr>
-        <p:spPr/>
-        <p:txBody>
-          <a:bodyPr/>
-          <a:lstStyle/>
-          <a:p>
-            <a:pPr marL="0" marR="0" indent="0" algn="l" defTabSz="457200" rtl="0" eaLnBrk="1" fontAlgn="auto" latinLnBrk="0" hangingPunct="1">
-              <a:lnSpc>
-                <a:spcPct val="100000"/>
-              </a:lnSpc>
-              <a:spcBef>
-                <a:spcPts val="0"/>
-              </a:spcBef>
-              <a:spcAft>
-                <a:spcPts val="0"/>
-              </a:spcAft>
-              <a:buClrTx/>
-              <a:buSzTx/>
-              <a:buFontTx/>
-              <a:buNone/>
-              <a:tabLst/>
-              <a:defRPr/>
-            </a:pPr>
-            <a:endParaRPr lang="en-US" sz="1200" baseline="0" dirty="0" smtClean="0">
-              <a:solidFill>
-                <a:prstClr val="black"/>
-              </a:solidFill>
-              <a:latin typeface="ArialMT"/>
-            </a:endParaRPr>
-          </a:p>
-        </p:txBody>
-      </p:sp>
-      <p:sp>
-        <p:nvSpPr>
-          <p:cNvPr id="4" name="Slide Number Placeholder 3"/>
-          <p:cNvSpPr>
-            <a:spLocks noGrp="1"/>
-          </p:cNvSpPr>
-          <p:nvPr>
-            <p:ph type="sldNum" sz="quarter" idx="10"/>
-          </p:nvPr>
-        </p:nvSpPr>
-        <p:spPr/>
-        <p:txBody>
-          <a:bodyPr/>
-          <a:lstStyle/>
-          <a:p>
-            <a:fld id="{ADD4B5B7-85EF-4E48-AC80-2380FACD9C23}" type="slidenum">
-              <a:rPr lang="en-US" smtClean="0"/>
-              <a:t>63</a:t>
-            </a:fld>
-            <a:endParaRPr lang="en-US"/>
-          </a:p>
-        </p:txBody>
-      </p:sp>
-    </p:spTree>
-    <p:extLst>
-      <p:ext uri="{BB962C8B-B14F-4D97-AF65-F5344CB8AC3E}">
-        <p14:creationId xmlns:p14="http://schemas.microsoft.com/office/powerpoint/2010/main" val="645762702"/>
       </p:ext>
     </p:extLst>
   </p:cSld>
@@ -18155,7 +18048,23 @@
                 <a:ea typeface="ヒラギノ角ゴ ProN W6" charset="0"/>
                 <a:cs typeface="ヒラギノ角ゴ ProN W6" charset="0"/>
               </a:rPr>
-              <a:t>III. a spam filter</a:t>
+              <a:t>III. </a:t>
+            </a:r>
+            <a:r>
+              <a:rPr lang="en-US" sz="3000" dirty="0" smtClean="0">
+                <a:latin typeface="PFDinTextCompPro-Bold" charset="0"/>
+                <a:ea typeface="ヒラギノ角ゴ ProN W6" charset="0"/>
+                <a:cs typeface="ヒラギノ角ゴ ProN W6" charset="0"/>
+              </a:rPr>
+              <a:t>spam </a:t>
+            </a:r>
+            <a:r>
+              <a:rPr lang="en-US" sz="3000" dirty="0" smtClean="0">
+                <a:latin typeface="PFDinTextCompPro-Bold" charset="0"/>
+                <a:ea typeface="ヒラギノ角ゴ ProN W6" charset="0"/>
+                <a:cs typeface="ヒラギノ角ゴ ProN W6" charset="0"/>
+              </a:rPr>
+              <a:t>filter</a:t>
             </a:r>
             <a:endParaRPr lang="en-US" sz="3000" cap="none" dirty="0">
               <a:latin typeface="PFDinTextCompPro-Bold" charset="0"/>
@@ -19314,14 +19223,7 @@
                 <a:latin typeface="PFDinTextCompPro-Italic"/>
                 <a:cs typeface="PFDinTextCompPro-Italic"/>
               </a:rPr>
-              <a:t>from </a:t>
-            </a:r>
-            <a:r>
-              <a:rPr lang="en-US" sz="3000" dirty="0" smtClean="0">
-                <a:latin typeface="PFDinTextCompPro-Italic"/>
-                <a:cs typeface="PFDinTextCompPro-Italic"/>
-              </a:rPr>
-              <a:t>earlier</a:t>
+              <a:t>from earlier</a:t>
             </a:r>
             <a:endParaRPr lang="en-US" sz="3000" dirty="0">
               <a:latin typeface="PFDinTextCompPro-Italic"/>
@@ -19517,19 +19419,8 @@
                 <a:latin typeface="PFDinTextCompPro-Italic"/>
                 <a:cs typeface="PFDinTextCompPro-Italic"/>
               </a:rPr>
-              <a:t>from </a:t>
-            </a:r>
-            <a:r>
-              <a:rPr lang="en-US" sz="3000" dirty="0" smtClean="0">
-                <a:latin typeface="PFDinTextCompPro-Italic"/>
-                <a:cs typeface="PFDinTextCompPro-Italic"/>
-              </a:rPr>
-              <a:t>earlier</a:t>
-            </a:r>
-            <a:endParaRPr lang="en-US" sz="3000" dirty="0" smtClean="0">
-              <a:latin typeface="PFDinTextCompPro-Italic"/>
-              <a:cs typeface="PFDinTextCompPro-Italic"/>
-            </a:endParaRPr>
+              <a:t>from earlier</a:t>
+            </a:r>
           </a:p>
           <a:p>
             <a:pPr algn="l"/>
@@ -19755,19 +19646,8 @@
                 <a:latin typeface="PFDinTextCompPro-Italic"/>
                 <a:cs typeface="PFDinTextCompPro-Italic"/>
               </a:rPr>
-              <a:t>from </a:t>
-            </a:r>
-            <a:r>
-              <a:rPr lang="en-US" sz="3000" dirty="0" smtClean="0">
-                <a:latin typeface="PFDinTextCompPro-Italic"/>
-                <a:cs typeface="PFDinTextCompPro-Italic"/>
-              </a:rPr>
-              <a:t>earlier</a:t>
-            </a:r>
-            <a:endParaRPr lang="en-US" sz="3000" dirty="0" smtClean="0">
-              <a:latin typeface="PFDinTextCompPro-Italic"/>
-              <a:cs typeface="PFDinTextCompPro-Italic"/>
-            </a:endParaRPr>
+              <a:t>from earlier</a:t>
+            </a:r>
           </a:p>
           <a:p>
             <a:pPr algn="l"/>
@@ -20053,19 +19933,8 @@
                 <a:latin typeface="PFDinTextCompPro-Italic"/>
                 <a:cs typeface="PFDinTextCompPro-Italic"/>
               </a:rPr>
-              <a:t>from </a:t>
-            </a:r>
-            <a:r>
-              <a:rPr lang="en-US" sz="3000" dirty="0" smtClean="0">
-                <a:latin typeface="PFDinTextCompPro-Italic"/>
-                <a:cs typeface="PFDinTextCompPro-Italic"/>
-              </a:rPr>
-              <a:t>earlier</a:t>
-            </a:r>
-            <a:endParaRPr lang="en-US" sz="3000" dirty="0" smtClean="0">
-              <a:latin typeface="PFDinTextCompPro-Italic"/>
-              <a:cs typeface="PFDinTextCompPro-Italic"/>
-            </a:endParaRPr>
+              <a:t>from earlier</a:t>
+            </a:r>
           </a:p>
           <a:p>
             <a:pPr algn="l"/>
@@ -20403,19 +20272,8 @@
                 <a:latin typeface="PFDinTextCompPro-Italic"/>
                 <a:cs typeface="PFDinTextCompPro-Italic"/>
               </a:rPr>
-              <a:t>from </a:t>
-            </a:r>
-            <a:r>
-              <a:rPr lang="en-US" sz="3000" dirty="0" smtClean="0">
-                <a:latin typeface="PFDinTextCompPro-Italic"/>
-                <a:cs typeface="PFDinTextCompPro-Italic"/>
-              </a:rPr>
-              <a:t>earlier</a:t>
-            </a:r>
-            <a:endParaRPr lang="en-US" sz="3000" dirty="0" smtClean="0">
-              <a:latin typeface="PFDinTextCompPro-Italic"/>
-              <a:cs typeface="PFDinTextCompPro-Italic"/>
-            </a:endParaRPr>
+              <a:t>from earlier</a:t>
+            </a:r>
           </a:p>
           <a:p>
             <a:pPr algn="l"/>
@@ -28353,774 +28211,6 @@
     <p:extLst>
       <p:ext uri="{BB962C8B-B14F-4D97-AF65-F5344CB8AC3E}">
         <p14:creationId xmlns:p14="http://schemas.microsoft.com/office/powerpoint/2010/main" val="2943625627"/>
-      </p:ext>
-    </p:extLst>
-  </p:cSld>
-  <p:clrMapOvr>
-    <a:masterClrMapping/>
-  </p:clrMapOvr>
-  <p:transition xmlns:p14="http://schemas.microsoft.com/office/powerpoint/2010/main"/>
-  <p:timing>
-    <p:tnLst>
-      <p:par>
-        <p:cTn xmlns:p14="http://schemas.microsoft.com/office/powerpoint/2010/main" id="1" dur="indefinite" restart="never" nodeType="tmRoot"/>
-      </p:par>
-    </p:tnLst>
-  </p:timing>
-</p:sld>
-</file>
-
-<file path=ppt/slides/slide63.xml><?xml version="1.0" encoding="utf-8"?>
-<p:sld xmlns:a="http://schemas.openxmlformats.org/drawingml/2006/main" xmlns:r="http://schemas.openxmlformats.org/officeDocument/2006/relationships" xmlns:p="http://schemas.openxmlformats.org/presentationml/2006/main">
-  <p:cSld>
-    <p:spTree>
-      <p:nvGrpSpPr>
-        <p:cNvPr id="1" name=""/>
-        <p:cNvGrpSpPr/>
-        <p:nvPr/>
-      </p:nvGrpSpPr>
-      <p:grpSpPr>
-        <a:xfrm>
-          <a:off x="0" y="0"/>
-          <a:ext cx="0" cy="0"/>
-          <a:chOff x="0" y="0"/>
-          <a:chExt cx="0" cy="0"/>
-        </a:xfrm>
-      </p:grpSpPr>
-      <p:sp>
-        <p:nvSpPr>
-          <p:cNvPr id="4" name="Content Placeholder 3"/>
-          <p:cNvSpPr>
-            <a:spLocks noGrp="1"/>
-          </p:cNvSpPr>
-          <p:nvPr>
-            <p:ph sz="quarter" idx="11"/>
-          </p:nvPr>
-        </p:nvSpPr>
-        <p:spPr>
-          <a:xfrm>
-            <a:off x="414337" y="495300"/>
-            <a:ext cx="7162800" cy="304800"/>
-          </a:xfrm>
-        </p:spPr>
-        <p:txBody>
-          <a:bodyPr/>
-          <a:lstStyle/>
-          <a:p>
-            <a:pPr eaLnBrk="1" hangingPunct="1">
-              <a:lnSpc>
-                <a:spcPts val="2448"/>
-              </a:lnSpc>
-              <a:defRPr/>
-            </a:pPr>
-            <a:r>
-              <a:rPr lang="en-US" dirty="0" smtClean="0"/>
-              <a:t>Exercise – spam filter (document classification)</a:t>
-            </a:r>
-          </a:p>
-        </p:txBody>
-      </p:sp>
-      <p:sp>
-        <p:nvSpPr>
-          <p:cNvPr id="8" name="Slide Number Placeholder 3"/>
-          <p:cNvSpPr>
-            <a:spLocks noGrp="1"/>
-          </p:cNvSpPr>
-          <p:nvPr>
-            <p:ph type="sldNum" sz="quarter" idx="13"/>
-          </p:nvPr>
-        </p:nvSpPr>
-        <p:spPr/>
-        <p:txBody>
-          <a:bodyPr/>
-          <a:lstStyle/>
-          <a:p>
-            <a:pPr>
-              <a:defRPr/>
-            </a:pPr>
-            <a:fld id="{BD5AD749-DAD1-6A4A-A2AA-CB20EAD0AEB7}" type="slidenum">
-              <a:rPr lang="en-US"/>
-              <a:pPr>
-                <a:defRPr/>
-              </a:pPr>
-              <a:t>63</a:t>
-            </a:fld>
-            <a:endParaRPr lang="en-US"/>
-          </a:p>
-        </p:txBody>
-      </p:sp>
-      <p:sp>
-        <p:nvSpPr>
-          <p:cNvPr id="17" name="Text Placeholder 11"/>
-          <p:cNvSpPr txBox="1">
-            <a:spLocks/>
-          </p:cNvSpPr>
-          <p:nvPr/>
-        </p:nvSpPr>
-        <p:spPr>
-          <a:xfrm>
-            <a:off x="719137" y="1181100"/>
-            <a:ext cx="2689225" cy="490538"/>
-          </a:xfrm>
-          <a:prstGeom prst="rect">
-            <a:avLst/>
-          </a:prstGeom>
-        </p:spPr>
-        <p:txBody>
-          <a:bodyPr vert="horz" lIns="0" tIns="32914" rIns="65828" bIns="32914"/>
-          <a:lstStyle>
-            <a:lvl1pPr marL="174625" indent="-174625" algn="l" rtl="0" eaLnBrk="0" fontAlgn="base" hangingPunct="0">
-              <a:lnSpc>
-                <a:spcPts val="2450"/>
-              </a:lnSpc>
-              <a:spcBef>
-                <a:spcPct val="0"/>
-              </a:spcBef>
-              <a:spcAft>
-                <a:spcPct val="0"/>
-              </a:spcAft>
-              <a:buSzPct val="69000"/>
-              <a:buFont typeface="Lucida Grande"/>
-              <a:buChar char="‣"/>
-              <a:defRPr sz="2000" baseline="0">
-                <a:solidFill>
-                  <a:schemeClr val="tx1"/>
-                </a:solidFill>
-                <a:latin typeface="+mn-lt"/>
-                <a:ea typeface="+mn-ea"/>
-                <a:cs typeface="+mn-cs"/>
-                <a:sym typeface="News706 BT" charset="0"/>
-              </a:defRPr>
-            </a:lvl1pPr>
-            <a:lvl2pPr marL="329138" indent="0" algn="ctr" rtl="0" eaLnBrk="0" fontAlgn="base" hangingPunct="0">
-              <a:lnSpc>
-                <a:spcPts val="2450"/>
-              </a:lnSpc>
-              <a:spcBef>
-                <a:spcPct val="0"/>
-              </a:spcBef>
-              <a:spcAft>
-                <a:spcPct val="0"/>
-              </a:spcAft>
-              <a:buSzPct val="69000"/>
-              <a:buFont typeface="Lucida Grande" charset="0"/>
-              <a:buNone/>
-              <a:defRPr sz="2000">
-                <a:solidFill>
-                  <a:schemeClr val="tx1"/>
-                </a:solidFill>
-                <a:latin typeface="+mn-lt"/>
-                <a:ea typeface="+mn-ea"/>
-                <a:cs typeface="+mn-cs"/>
-                <a:sym typeface="News706 BT" charset="0"/>
-              </a:defRPr>
-            </a:lvl2pPr>
-            <a:lvl3pPr marL="658277" indent="0" algn="ctr" rtl="0" eaLnBrk="0" fontAlgn="base" hangingPunct="0">
-              <a:lnSpc>
-                <a:spcPts val="2450"/>
-              </a:lnSpc>
-              <a:spcBef>
-                <a:spcPct val="0"/>
-              </a:spcBef>
-              <a:spcAft>
-                <a:spcPct val="0"/>
-              </a:spcAft>
-              <a:buSzPct val="69000"/>
-              <a:buFont typeface="Lucida Grande" charset="0"/>
-              <a:buNone/>
-              <a:defRPr sz="2000">
-                <a:solidFill>
-                  <a:schemeClr val="tx1"/>
-                </a:solidFill>
-                <a:latin typeface="+mn-lt"/>
-                <a:ea typeface="+mn-ea"/>
-                <a:cs typeface="+mn-cs"/>
-                <a:sym typeface="News706 BT" charset="0"/>
-              </a:defRPr>
-            </a:lvl3pPr>
-            <a:lvl4pPr marL="987415" indent="0" algn="ctr" rtl="0" eaLnBrk="0" fontAlgn="base" hangingPunct="0">
-              <a:lnSpc>
-                <a:spcPts val="2450"/>
-              </a:lnSpc>
-              <a:spcBef>
-                <a:spcPct val="0"/>
-              </a:spcBef>
-              <a:spcAft>
-                <a:spcPct val="0"/>
-              </a:spcAft>
-              <a:buSzPct val="69000"/>
-              <a:buFont typeface="Lucida Grande" charset="0"/>
-              <a:buNone/>
-              <a:defRPr sz="2000">
-                <a:solidFill>
-                  <a:schemeClr val="tx1"/>
-                </a:solidFill>
-                <a:latin typeface="+mn-lt"/>
-                <a:ea typeface="+mn-ea"/>
-                <a:cs typeface="+mn-cs"/>
-                <a:sym typeface="News706 BT" charset="0"/>
-              </a:defRPr>
-            </a:lvl4pPr>
-            <a:lvl5pPr marL="1316553" indent="0" algn="ctr" rtl="0" eaLnBrk="0" fontAlgn="base" hangingPunct="0">
-              <a:lnSpc>
-                <a:spcPts val="2450"/>
-              </a:lnSpc>
-              <a:spcBef>
-                <a:spcPct val="0"/>
-              </a:spcBef>
-              <a:spcAft>
-                <a:spcPct val="0"/>
-              </a:spcAft>
-              <a:buSzPct val="69000"/>
-              <a:buFont typeface="Lucida Grande" charset="0"/>
-              <a:buNone/>
-              <a:defRPr sz="2000">
-                <a:solidFill>
-                  <a:schemeClr val="tx1"/>
-                </a:solidFill>
-                <a:latin typeface="+mn-lt"/>
-                <a:ea typeface="+mn-ea"/>
-                <a:cs typeface="+mn-cs"/>
-                <a:sym typeface="News706 BT" charset="0"/>
-              </a:defRPr>
-            </a:lvl5pPr>
-            <a:lvl6pPr marL="1645691" indent="0" algn="ctr" rtl="0" fontAlgn="base">
-              <a:lnSpc>
-                <a:spcPts val="2448"/>
-              </a:lnSpc>
-              <a:spcBef>
-                <a:spcPct val="0"/>
-              </a:spcBef>
-              <a:spcAft>
-                <a:spcPct val="0"/>
-              </a:spcAft>
-              <a:buSzPct val="69000"/>
-              <a:buFont typeface="Lucida Grande" charset="0"/>
-              <a:buNone/>
-              <a:defRPr sz="2000">
-                <a:solidFill>
-                  <a:schemeClr val="tx1"/>
-                </a:solidFill>
-                <a:latin typeface="+mn-lt"/>
-                <a:ea typeface="+mn-ea"/>
-                <a:cs typeface="+mn-cs"/>
-                <a:sym typeface="News706 BT" charset="0"/>
-              </a:defRPr>
-            </a:lvl6pPr>
-            <a:lvl7pPr marL="1974830" indent="0" algn="ctr" rtl="0" fontAlgn="base">
-              <a:lnSpc>
-                <a:spcPts val="2448"/>
-              </a:lnSpc>
-              <a:spcBef>
-                <a:spcPct val="0"/>
-              </a:spcBef>
-              <a:spcAft>
-                <a:spcPct val="0"/>
-              </a:spcAft>
-              <a:buSzPct val="69000"/>
-              <a:buFont typeface="Lucida Grande" charset="0"/>
-              <a:buNone/>
-              <a:defRPr sz="2000">
-                <a:solidFill>
-                  <a:schemeClr val="tx1"/>
-                </a:solidFill>
-                <a:latin typeface="+mn-lt"/>
-                <a:ea typeface="+mn-ea"/>
-                <a:cs typeface="+mn-cs"/>
-                <a:sym typeface="News706 BT" charset="0"/>
-              </a:defRPr>
-            </a:lvl7pPr>
-            <a:lvl8pPr marL="2303968" indent="0" algn="ctr" rtl="0" fontAlgn="base">
-              <a:lnSpc>
-                <a:spcPts val="2448"/>
-              </a:lnSpc>
-              <a:spcBef>
-                <a:spcPct val="0"/>
-              </a:spcBef>
-              <a:spcAft>
-                <a:spcPct val="0"/>
-              </a:spcAft>
-              <a:buSzPct val="69000"/>
-              <a:buFont typeface="Lucida Grande" charset="0"/>
-              <a:buNone/>
-              <a:defRPr sz="2000">
-                <a:solidFill>
-                  <a:schemeClr val="tx1"/>
-                </a:solidFill>
-                <a:latin typeface="+mn-lt"/>
-                <a:ea typeface="+mn-ea"/>
-                <a:cs typeface="+mn-cs"/>
-                <a:sym typeface="News706 BT" charset="0"/>
-              </a:defRPr>
-            </a:lvl8pPr>
-            <a:lvl9pPr marL="2633106" indent="0" algn="ctr" rtl="0" fontAlgn="base">
-              <a:lnSpc>
-                <a:spcPts val="2448"/>
-              </a:lnSpc>
-              <a:spcBef>
-                <a:spcPct val="0"/>
-              </a:spcBef>
-              <a:spcAft>
-                <a:spcPct val="0"/>
-              </a:spcAft>
-              <a:buSzPct val="69000"/>
-              <a:buFont typeface="Lucida Grande" charset="0"/>
-              <a:buNone/>
-              <a:defRPr sz="2000">
-                <a:solidFill>
-                  <a:schemeClr val="tx1"/>
-                </a:solidFill>
-                <a:latin typeface="+mn-lt"/>
-                <a:ea typeface="+mn-ea"/>
-                <a:cs typeface="+mn-cs"/>
-                <a:sym typeface="News706 BT" charset="0"/>
-              </a:defRPr>
-            </a:lvl9pPr>
-          </a:lstStyle>
-          <a:p>
-            <a:pPr marL="0" indent="0">
-              <a:buNone/>
-              <a:defRPr/>
-            </a:pPr>
-            <a:r>
-              <a:rPr lang="en-US" sz="1400" b="1" cap="all" dirty="0" smtClean="0">
-                <a:latin typeface="PFDinTextCompPro-Bold"/>
-                <a:cs typeface="PFDinTextCompPro-Bold"/>
-              </a:rPr>
-              <a:t>Key objectives</a:t>
-            </a:r>
-            <a:endParaRPr lang="en-US" sz="1400" b="1" cap="all" dirty="0">
-              <a:latin typeface="PFDinTextCompPro-Bold"/>
-              <a:cs typeface="PFDinTextCompPro-Bold"/>
-            </a:endParaRPr>
-          </a:p>
-        </p:txBody>
-      </p:sp>
-      <p:sp>
-        <p:nvSpPr>
-          <p:cNvPr id="18" name="Content Placeholder 12"/>
-          <p:cNvSpPr>
-            <a:spLocks noGrp="1"/>
-          </p:cNvSpPr>
-          <p:nvPr>
-            <p:ph sz="half" idx="4294967295"/>
-          </p:nvPr>
-        </p:nvSpPr>
-        <p:spPr bwMode="auto">
-          <a:xfrm>
-            <a:off x="490537" y="1771650"/>
-            <a:ext cx="8077200" cy="2838450"/>
-          </a:xfrm>
-          <a:prstGeom prst="rect">
-            <a:avLst/>
-          </a:prstGeom>
-          <a:noFill/>
-          <a:extLst>
-            <a:ext uri="{909E8E84-426E-40dd-AFC4-6F175D3DCCD1}">
-              <a14:hiddenFill xmlns:a14="http://schemas.microsoft.com/office/drawing/2010/main">
-                <a:solidFill>
-                  <a:srgbClr val="FFFFFF"/>
-                </a:solidFill>
-              </a14:hiddenFill>
-            </a:ext>
-            <a:ext uri="{91240B29-F687-4f45-9708-019B960494DF}">
-              <a14:hiddenLine xmlns:a14="http://schemas.microsoft.com/office/drawing/2010/main" w="9525">
-                <a:solidFill>
-                  <a:srgbClr val="000000"/>
-                </a:solidFill>
-                <a:miter lim="800000"/>
-                <a:headEnd/>
-                <a:tailEnd/>
-              </a14:hiddenLine>
-            </a:ext>
-          </a:extLst>
-        </p:spPr>
-        <p:txBody>
-          <a:bodyPr wrap="square" numCol="1" anchor="t" anchorCtr="0" compatLnSpc="1">
-            <a:prstTxWarp prst="textNoShape">
-              <a:avLst/>
-            </a:prstTxWarp>
-          </a:bodyPr>
-          <a:lstStyle/>
-          <a:p>
-            <a:pPr marL="0" indent="0">
-              <a:buNone/>
-            </a:pPr>
-            <a:r>
-              <a:rPr lang="en-US" sz="2300" dirty="0" smtClean="0">
-                <a:latin typeface="PFDinTextCompPro-Italic"/>
-                <a:ea typeface="ヒラギノ角ゴ ProN W3" charset="0"/>
-                <a:cs typeface="PFDinTextCompPro-Italic"/>
-              </a:rPr>
-              <a:t>- </a:t>
-            </a:r>
-            <a:r>
-              <a:rPr lang="en-US" sz="2300" dirty="0">
-                <a:latin typeface="PFDinTextCompPro-Italic"/>
-                <a:ea typeface="ヒラギノ角ゴ ProN W3" charset="0"/>
-                <a:cs typeface="PFDinTextCompPro-Italic"/>
-              </a:rPr>
-              <a:t>preprocess data			</a:t>
-            </a:r>
-            <a:r>
-              <a:rPr lang="en-US" sz="2300" dirty="0" smtClean="0">
-                <a:latin typeface="PFDinTextCompPro-Italic"/>
-                <a:ea typeface="ヒラギノ角ゴ ProN W3" charset="0"/>
-                <a:cs typeface="PFDinTextCompPro-Italic"/>
-              </a:rPr>
-              <a:t>	- tm, R</a:t>
-            </a:r>
-          </a:p>
-          <a:p>
-            <a:pPr marL="0" indent="0">
-              <a:buNone/>
-            </a:pPr>
-            <a:r>
-              <a:rPr lang="en-US" sz="2300" dirty="0" smtClean="0">
-                <a:latin typeface="PFDinTextCompPro-Italic"/>
-                <a:ea typeface="ヒラギノ角ゴ ProN W3" charset="0"/>
-                <a:cs typeface="PFDinTextCompPro-Italic"/>
-              </a:rPr>
-              <a:t>- perform naïve Bayes classification</a:t>
-            </a:r>
-          </a:p>
-        </p:txBody>
-      </p:sp>
-      <p:sp>
-        <p:nvSpPr>
-          <p:cNvPr id="21" name="Text Placeholder 11"/>
-          <p:cNvSpPr txBox="1">
-            <a:spLocks/>
-          </p:cNvSpPr>
-          <p:nvPr/>
-        </p:nvSpPr>
-        <p:spPr>
-          <a:xfrm>
-            <a:off x="5138737" y="1181100"/>
-            <a:ext cx="2689225" cy="490538"/>
-          </a:xfrm>
-          <a:prstGeom prst="rect">
-            <a:avLst/>
-          </a:prstGeom>
-        </p:spPr>
-        <p:txBody>
-          <a:bodyPr vert="horz" lIns="0" tIns="32914" rIns="65828" bIns="32914"/>
-          <a:lstStyle>
-            <a:lvl1pPr marL="174625" indent="-174625" algn="l" rtl="0" eaLnBrk="0" fontAlgn="base" hangingPunct="0">
-              <a:lnSpc>
-                <a:spcPts val="2450"/>
-              </a:lnSpc>
-              <a:spcBef>
-                <a:spcPct val="0"/>
-              </a:spcBef>
-              <a:spcAft>
-                <a:spcPct val="0"/>
-              </a:spcAft>
-              <a:buSzPct val="69000"/>
-              <a:buFont typeface="Lucida Grande"/>
-              <a:buChar char="‣"/>
-              <a:defRPr sz="2000" baseline="0">
-                <a:solidFill>
-                  <a:schemeClr val="tx1"/>
-                </a:solidFill>
-                <a:latin typeface="+mn-lt"/>
-                <a:ea typeface="+mn-ea"/>
-                <a:cs typeface="+mn-cs"/>
-                <a:sym typeface="News706 BT" charset="0"/>
-              </a:defRPr>
-            </a:lvl1pPr>
-            <a:lvl2pPr marL="329138" indent="0" algn="ctr" rtl="0" eaLnBrk="0" fontAlgn="base" hangingPunct="0">
-              <a:lnSpc>
-                <a:spcPts val="2450"/>
-              </a:lnSpc>
-              <a:spcBef>
-                <a:spcPct val="0"/>
-              </a:spcBef>
-              <a:spcAft>
-                <a:spcPct val="0"/>
-              </a:spcAft>
-              <a:buSzPct val="69000"/>
-              <a:buFont typeface="Lucida Grande" charset="0"/>
-              <a:buNone/>
-              <a:defRPr sz="2000">
-                <a:solidFill>
-                  <a:schemeClr val="tx1"/>
-                </a:solidFill>
-                <a:latin typeface="+mn-lt"/>
-                <a:ea typeface="+mn-ea"/>
-                <a:cs typeface="+mn-cs"/>
-                <a:sym typeface="News706 BT" charset="0"/>
-              </a:defRPr>
-            </a:lvl2pPr>
-            <a:lvl3pPr marL="658277" indent="0" algn="ctr" rtl="0" eaLnBrk="0" fontAlgn="base" hangingPunct="0">
-              <a:lnSpc>
-                <a:spcPts val="2450"/>
-              </a:lnSpc>
-              <a:spcBef>
-                <a:spcPct val="0"/>
-              </a:spcBef>
-              <a:spcAft>
-                <a:spcPct val="0"/>
-              </a:spcAft>
-              <a:buSzPct val="69000"/>
-              <a:buFont typeface="Lucida Grande" charset="0"/>
-              <a:buNone/>
-              <a:defRPr sz="2000">
-                <a:solidFill>
-                  <a:schemeClr val="tx1"/>
-                </a:solidFill>
-                <a:latin typeface="+mn-lt"/>
-                <a:ea typeface="+mn-ea"/>
-                <a:cs typeface="+mn-cs"/>
-                <a:sym typeface="News706 BT" charset="0"/>
-              </a:defRPr>
-            </a:lvl3pPr>
-            <a:lvl4pPr marL="987415" indent="0" algn="ctr" rtl="0" eaLnBrk="0" fontAlgn="base" hangingPunct="0">
-              <a:lnSpc>
-                <a:spcPts val="2450"/>
-              </a:lnSpc>
-              <a:spcBef>
-                <a:spcPct val="0"/>
-              </a:spcBef>
-              <a:spcAft>
-                <a:spcPct val="0"/>
-              </a:spcAft>
-              <a:buSzPct val="69000"/>
-              <a:buFont typeface="Lucida Grande" charset="0"/>
-              <a:buNone/>
-              <a:defRPr sz="2000">
-                <a:solidFill>
-                  <a:schemeClr val="tx1"/>
-                </a:solidFill>
-                <a:latin typeface="+mn-lt"/>
-                <a:ea typeface="+mn-ea"/>
-                <a:cs typeface="+mn-cs"/>
-                <a:sym typeface="News706 BT" charset="0"/>
-              </a:defRPr>
-            </a:lvl4pPr>
-            <a:lvl5pPr marL="1316553" indent="0" algn="ctr" rtl="0" eaLnBrk="0" fontAlgn="base" hangingPunct="0">
-              <a:lnSpc>
-                <a:spcPts val="2450"/>
-              </a:lnSpc>
-              <a:spcBef>
-                <a:spcPct val="0"/>
-              </a:spcBef>
-              <a:spcAft>
-                <a:spcPct val="0"/>
-              </a:spcAft>
-              <a:buSzPct val="69000"/>
-              <a:buFont typeface="Lucida Grande" charset="0"/>
-              <a:buNone/>
-              <a:defRPr sz="2000">
-                <a:solidFill>
-                  <a:schemeClr val="tx1"/>
-                </a:solidFill>
-                <a:latin typeface="+mn-lt"/>
-                <a:ea typeface="+mn-ea"/>
-                <a:cs typeface="+mn-cs"/>
-                <a:sym typeface="News706 BT" charset="0"/>
-              </a:defRPr>
-            </a:lvl5pPr>
-            <a:lvl6pPr marL="1645691" indent="0" algn="ctr" rtl="0" fontAlgn="base">
-              <a:lnSpc>
-                <a:spcPts val="2448"/>
-              </a:lnSpc>
-              <a:spcBef>
-                <a:spcPct val="0"/>
-              </a:spcBef>
-              <a:spcAft>
-                <a:spcPct val="0"/>
-              </a:spcAft>
-              <a:buSzPct val="69000"/>
-              <a:buFont typeface="Lucida Grande" charset="0"/>
-              <a:buNone/>
-              <a:defRPr sz="2000">
-                <a:solidFill>
-                  <a:schemeClr val="tx1"/>
-                </a:solidFill>
-                <a:latin typeface="+mn-lt"/>
-                <a:ea typeface="+mn-ea"/>
-                <a:cs typeface="+mn-cs"/>
-                <a:sym typeface="News706 BT" charset="0"/>
-              </a:defRPr>
-            </a:lvl6pPr>
-            <a:lvl7pPr marL="1974830" indent="0" algn="ctr" rtl="0" fontAlgn="base">
-              <a:lnSpc>
-                <a:spcPts val="2448"/>
-              </a:lnSpc>
-              <a:spcBef>
-                <a:spcPct val="0"/>
-              </a:spcBef>
-              <a:spcAft>
-                <a:spcPct val="0"/>
-              </a:spcAft>
-              <a:buSzPct val="69000"/>
-              <a:buFont typeface="Lucida Grande" charset="0"/>
-              <a:buNone/>
-              <a:defRPr sz="2000">
-                <a:solidFill>
-                  <a:schemeClr val="tx1"/>
-                </a:solidFill>
-                <a:latin typeface="+mn-lt"/>
-                <a:ea typeface="+mn-ea"/>
-                <a:cs typeface="+mn-cs"/>
-                <a:sym typeface="News706 BT" charset="0"/>
-              </a:defRPr>
-            </a:lvl7pPr>
-            <a:lvl8pPr marL="2303968" indent="0" algn="ctr" rtl="0" fontAlgn="base">
-              <a:lnSpc>
-                <a:spcPts val="2448"/>
-              </a:lnSpc>
-              <a:spcBef>
-                <a:spcPct val="0"/>
-              </a:spcBef>
-              <a:spcAft>
-                <a:spcPct val="0"/>
-              </a:spcAft>
-              <a:buSzPct val="69000"/>
-              <a:buFont typeface="Lucida Grande" charset="0"/>
-              <a:buNone/>
-              <a:defRPr sz="2000">
-                <a:solidFill>
-                  <a:schemeClr val="tx1"/>
-                </a:solidFill>
-                <a:latin typeface="+mn-lt"/>
-                <a:ea typeface="+mn-ea"/>
-                <a:cs typeface="+mn-cs"/>
-                <a:sym typeface="News706 BT" charset="0"/>
-              </a:defRPr>
-            </a:lvl8pPr>
-            <a:lvl9pPr marL="2633106" indent="0" algn="ctr" rtl="0" fontAlgn="base">
-              <a:lnSpc>
-                <a:spcPts val="2448"/>
-              </a:lnSpc>
-              <a:spcBef>
-                <a:spcPct val="0"/>
-              </a:spcBef>
-              <a:spcAft>
-                <a:spcPct val="0"/>
-              </a:spcAft>
-              <a:buSzPct val="69000"/>
-              <a:buFont typeface="Lucida Grande" charset="0"/>
-              <a:buNone/>
-              <a:defRPr sz="2000">
-                <a:solidFill>
-                  <a:schemeClr val="tx1"/>
-                </a:solidFill>
-                <a:latin typeface="+mn-lt"/>
-                <a:ea typeface="+mn-ea"/>
-                <a:cs typeface="+mn-cs"/>
-                <a:sym typeface="News706 BT" charset="0"/>
-              </a:defRPr>
-            </a:lvl9pPr>
-          </a:lstStyle>
-          <a:p>
-            <a:pPr marL="0" indent="0">
-              <a:buNone/>
-              <a:defRPr/>
-            </a:pPr>
-            <a:r>
-              <a:rPr lang="en-US" sz="1400" b="1" cap="all" dirty="0" smtClean="0">
-                <a:latin typeface="PFDinTextCompPro-Bold"/>
-                <a:cs typeface="PFDinTextCompPro-Bold"/>
-              </a:rPr>
-              <a:t>tools</a:t>
-            </a:r>
-            <a:endParaRPr lang="en-US" sz="1400" b="1" cap="all" dirty="0">
-              <a:latin typeface="PFDinTextCompPro-Bold"/>
-              <a:cs typeface="PFDinTextCompPro-Bold"/>
-            </a:endParaRPr>
-          </a:p>
-        </p:txBody>
-      </p:sp>
-      <p:cxnSp>
-        <p:nvCxnSpPr>
-          <p:cNvPr id="29" name="Straight Connector 28"/>
-          <p:cNvCxnSpPr/>
-          <p:nvPr/>
-        </p:nvCxnSpPr>
-        <p:spPr bwMode="auto">
-          <a:xfrm>
-            <a:off x="566737" y="1638300"/>
-            <a:ext cx="3505200" cy="0"/>
-          </a:xfrm>
-          <a:prstGeom prst="line">
-            <a:avLst/>
-          </a:prstGeom>
-          <a:solidFill>
-            <a:schemeClr val="accent1"/>
-          </a:solidFill>
-          <a:ln w="12700" cap="flat" cmpd="sng" algn="ctr">
-            <a:solidFill>
-              <a:srgbClr val="000000"/>
-            </a:solidFill>
-            <a:prstDash val="solid"/>
-            <a:round/>
-            <a:headEnd type="none" w="med" len="med"/>
-            <a:tailEnd type="none" w="med" len="med"/>
-          </a:ln>
-          <a:effectLst/>
-          <a:extLst>
-            <a:ext uri="{AF507438-7753-43e0-B8FC-AC1667EBCBE1}">
-              <a14:hiddenEffects xmlns:a14="http://schemas.microsoft.com/office/drawing/2010/main">
-                <a:effectLst>
-                  <a:outerShdw blurRad="63500" dist="38099" dir="2700000" algn="ctr" rotWithShape="0">
-                    <a:schemeClr val="bg2">
-                      <a:alpha val="74998"/>
-                    </a:schemeClr>
-                  </a:outerShdw>
-                </a:effectLst>
-              </a14:hiddenEffects>
-            </a:ext>
-          </a:extLst>
-        </p:spPr>
-      </p:cxnSp>
-      <p:cxnSp>
-        <p:nvCxnSpPr>
-          <p:cNvPr id="31" name="Straight Connector 30"/>
-          <p:cNvCxnSpPr/>
-          <p:nvPr/>
-        </p:nvCxnSpPr>
-        <p:spPr bwMode="auto">
-          <a:xfrm>
-            <a:off x="5062537" y="1638300"/>
-            <a:ext cx="3810000" cy="0"/>
-          </a:xfrm>
-          <a:prstGeom prst="line">
-            <a:avLst/>
-          </a:prstGeom>
-          <a:solidFill>
-            <a:schemeClr val="accent1"/>
-          </a:solidFill>
-          <a:ln w="12700" cap="flat" cmpd="sng" algn="ctr">
-            <a:solidFill>
-              <a:srgbClr val="000000"/>
-            </a:solidFill>
-            <a:prstDash val="solid"/>
-            <a:round/>
-            <a:headEnd type="none" w="med" len="med"/>
-            <a:tailEnd type="none" w="med" len="med"/>
-          </a:ln>
-          <a:effectLst/>
-          <a:extLst>
-            <a:ext uri="{AF507438-7753-43e0-B8FC-AC1667EBCBE1}">
-              <a14:hiddenEffects xmlns:a14="http://schemas.microsoft.com/office/drawing/2010/main">
-                <a:effectLst>
-                  <a:outerShdw blurRad="63500" dist="38099" dir="2700000" algn="ctr" rotWithShape="0">
-                    <a:schemeClr val="bg2">
-                      <a:alpha val="74998"/>
-                    </a:schemeClr>
-                  </a:outerShdw>
-                </a:effectLst>
-              </a14:hiddenEffects>
-            </a:ext>
-          </a:extLst>
-        </p:spPr>
-      </p:cxnSp>
-    </p:spTree>
-    <p:extLst>
-      <p:ext uri="{BB962C8B-B14F-4D97-AF65-F5344CB8AC3E}">
-        <p14:creationId xmlns:p14="http://schemas.microsoft.com/office/powerpoint/2010/main" val="4052175222"/>
       </p:ext>
     </p:extLst>
   </p:cSld>

</xml_diff>